<commit_message>
Configure the figure for the maps with different training data.
</commit_message>
<xml_diff>
--- a/Paper/fig/training_data_sets.pptx
+++ b/Paper/fig/training_data_sets.pptx
@@ -106,7 +106,7 @@
   </p:defaultTextStyle>
   <p:extLst>
     <p:ext uri="{EFAFB233-063F-42B5-8137-9DF3F51BA10A}">
-      <p15:sldGuideLst xmlns:p15="http://schemas.microsoft.com/office/powerpoint/2012/main">
+      <p15:sldGuideLst xmlns:p15="http://schemas.microsoft.com/office/powerpoint/2012/main" xmlns="">
         <p15:guide id="1" orient="horz" pos="2160">
           <p15:clr>
             <a:srgbClr val="A4A3A4"/>
@@ -121,6 +121,900 @@
     </p:ext>
   </p:extLst>
 </p:presentation>
+</file>
+
+<file path=ppt/charts/chart1.xml><?xml version="1.0" encoding="utf-8"?>
+<c:chartSpace xmlns:c="http://schemas.openxmlformats.org/drawingml/2006/chart" xmlns:a="http://schemas.openxmlformats.org/drawingml/2006/main" xmlns:r="http://schemas.openxmlformats.org/officeDocument/2006/relationships">
+  <c:date1904 val="0"/>
+  <c:lang val="en-US"/>
+  <c:roundedCorners val="0"/>
+  <mc:AlternateContent xmlns:mc="http://schemas.openxmlformats.org/markup-compatibility/2006">
+    <mc:Choice xmlns:c14="http://schemas.microsoft.com/office/drawing/2007/8/2/chart" Requires="c14">
+      <c14:style val="102"/>
+    </mc:Choice>
+    <mc:Fallback>
+      <c:style val="2"/>
+    </mc:Fallback>
+  </mc:AlternateContent>
+  <c:chart>
+    <c:autoTitleDeleted val="0"/>
+    <c:plotArea>
+      <c:layout>
+        <c:manualLayout>
+          <c:layoutTarget val="inner"/>
+          <c:xMode val="edge"/>
+          <c:yMode val="edge"/>
+          <c:x val="0.16709612860892387"/>
+          <c:y val="3.5300962379702538E-2"/>
+          <c:w val="0.78738932633420811"/>
+          <c:h val="0.80522980460775739"/>
+        </c:manualLayout>
+      </c:layout>
+      <c:scatterChart>
+        <c:scatterStyle val="lineMarker"/>
+        <c:varyColors val="0"/>
+        <c:ser>
+          <c:idx val="0"/>
+          <c:order val="0"/>
+          <c:tx>
+            <c:v>Operating Range (Map 6)</c:v>
+          </c:tx>
+          <c:spPr>
+            <a:ln w="63500"/>
+          </c:spPr>
+          <c:marker>
+            <c:symbol val="none"/>
+          </c:marker>
+          <c:xVal>
+            <c:numRef>
+              <c:f>Opearting_range_SI!$B$3:$B$19</c:f>
+              <c:numCache>
+                <c:formatCode>General</c:formatCode>
+                <c:ptCount val="17"/>
+                <c:pt idx="0">
+                  <c:v>-28.888888888888889</c:v>
+                </c:pt>
+                <c:pt idx="1">
+                  <c:v>-28.888888888888889</c:v>
+                </c:pt>
+                <c:pt idx="2">
+                  <c:v>-28.888888888888889</c:v>
+                </c:pt>
+                <c:pt idx="3">
+                  <c:v>-26.111111111111111</c:v>
+                </c:pt>
+                <c:pt idx="4">
+                  <c:v>-23.333333333333332</c:v>
+                </c:pt>
+                <c:pt idx="5">
+                  <c:v>-20.555555555555557</c:v>
+                </c:pt>
+                <c:pt idx="6">
+                  <c:v>-17.777777777777779</c:v>
+                </c:pt>
+                <c:pt idx="7">
+                  <c:v>-12.222222222222221</c:v>
+                </c:pt>
+                <c:pt idx="8">
+                  <c:v>12.777777777777779</c:v>
+                </c:pt>
+                <c:pt idx="9">
+                  <c:v>12.777777777777779</c:v>
+                </c:pt>
+                <c:pt idx="10">
+                  <c:v>12.777777777777779</c:v>
+                </c:pt>
+                <c:pt idx="11">
+                  <c:v>12.777777777777779</c:v>
+                </c:pt>
+                <c:pt idx="12">
+                  <c:v>12.777777777777779</c:v>
+                </c:pt>
+                <c:pt idx="13">
+                  <c:v>12.777777777777779</c:v>
+                </c:pt>
+                <c:pt idx="14">
+                  <c:v>12.777777777777779</c:v>
+                </c:pt>
+                <c:pt idx="15">
+                  <c:v>12.777777777777779</c:v>
+                </c:pt>
+                <c:pt idx="16">
+                  <c:v>-28.888888888888889</c:v>
+                </c:pt>
+              </c:numCache>
+            </c:numRef>
+          </c:xVal>
+          <c:yVal>
+            <c:numRef>
+              <c:f>Opearting_range_SI!$A$3:$A$19</c:f>
+              <c:numCache>
+                <c:formatCode>General</c:formatCode>
+                <c:ptCount val="17"/>
+                <c:pt idx="0">
+                  <c:v>26.666666666666668</c:v>
+                </c:pt>
+                <c:pt idx="1">
+                  <c:v>32.222222222222221</c:v>
+                </c:pt>
+                <c:pt idx="2">
+                  <c:v>37.777777777777779</c:v>
+                </c:pt>
+                <c:pt idx="3">
+                  <c:v>43.333333333333336</c:v>
+                </c:pt>
+                <c:pt idx="4">
+                  <c:v>48.888888888888886</c:v>
+                </c:pt>
+                <c:pt idx="5">
+                  <c:v>54.444444444444443</c:v>
+                </c:pt>
+                <c:pt idx="6">
+                  <c:v>60</c:v>
+                </c:pt>
+                <c:pt idx="7">
+                  <c:v>65.555555555555557</c:v>
+                </c:pt>
+                <c:pt idx="8">
+                  <c:v>65.555555555555557</c:v>
+                </c:pt>
+                <c:pt idx="9">
+                  <c:v>60</c:v>
+                </c:pt>
+                <c:pt idx="10">
+                  <c:v>54.444444444444443</c:v>
+                </c:pt>
+                <c:pt idx="11">
+                  <c:v>48.888888888888886</c:v>
+                </c:pt>
+                <c:pt idx="12">
+                  <c:v>43.333333333333336</c:v>
+                </c:pt>
+                <c:pt idx="13">
+                  <c:v>37.777777777777779</c:v>
+                </c:pt>
+                <c:pt idx="14">
+                  <c:v>32.222222222222221</c:v>
+                </c:pt>
+                <c:pt idx="15">
+                  <c:v>26.666666666666668</c:v>
+                </c:pt>
+                <c:pt idx="16">
+                  <c:v>26.666666666666668</c:v>
+                </c:pt>
+              </c:numCache>
+            </c:numRef>
+          </c:yVal>
+          <c:smooth val="0"/>
+        </c:ser>
+        <c:ser>
+          <c:idx val="1"/>
+          <c:order val="1"/>
+          <c:tx>
+            <c:strRef>
+              <c:f>Opearting_range_SI!$G$1</c:f>
+              <c:strCache>
+                <c:ptCount val="1"/>
+                <c:pt idx="0">
+                  <c:v>Map 1</c:v>
+                </c:pt>
+              </c:strCache>
+            </c:strRef>
+          </c:tx>
+          <c:spPr>
+            <a:ln w="82550" cmpd="dbl">
+              <a:prstDash val="sysDot"/>
+            </a:ln>
+          </c:spPr>
+          <c:marker>
+            <c:symbol val="none"/>
+          </c:marker>
+          <c:xVal>
+            <c:numRef>
+              <c:f>Opearting_range_SI!$H$3:$H$15</c:f>
+              <c:numCache>
+                <c:formatCode>General</c:formatCode>
+                <c:ptCount val="13"/>
+                <c:pt idx="0">
+                  <c:v>-15</c:v>
+                </c:pt>
+                <c:pt idx="1">
+                  <c:v>-15</c:v>
+                </c:pt>
+                <c:pt idx="2">
+                  <c:v>-15</c:v>
+                </c:pt>
+                <c:pt idx="3">
+                  <c:v>-15</c:v>
+                </c:pt>
+                <c:pt idx="4">
+                  <c:v>-15</c:v>
+                </c:pt>
+                <c:pt idx="5">
+                  <c:v>-12.222222222222221</c:v>
+                </c:pt>
+                <c:pt idx="6">
+                  <c:v>12.777777777777779</c:v>
+                </c:pt>
+                <c:pt idx="7">
+                  <c:v>12.777777777777779</c:v>
+                </c:pt>
+                <c:pt idx="8">
+                  <c:v>12.777777777777779</c:v>
+                </c:pt>
+                <c:pt idx="9">
+                  <c:v>12.777777777777779</c:v>
+                </c:pt>
+                <c:pt idx="10">
+                  <c:v>12.777777777777779</c:v>
+                </c:pt>
+                <c:pt idx="11">
+                  <c:v>12.777777777777779</c:v>
+                </c:pt>
+                <c:pt idx="12">
+                  <c:v>-15</c:v>
+                </c:pt>
+              </c:numCache>
+            </c:numRef>
+          </c:xVal>
+          <c:yVal>
+            <c:numRef>
+              <c:f>Opearting_range_SI!$G$3:$G$15</c:f>
+              <c:numCache>
+                <c:formatCode>General</c:formatCode>
+                <c:ptCount val="13"/>
+                <c:pt idx="0">
+                  <c:v>26.666666666666668</c:v>
+                </c:pt>
+                <c:pt idx="1">
+                  <c:v>43.333333333333336</c:v>
+                </c:pt>
+                <c:pt idx="2">
+                  <c:v>48.888888888888886</c:v>
+                </c:pt>
+                <c:pt idx="3">
+                  <c:v>54.444444444444443</c:v>
+                </c:pt>
+                <c:pt idx="4">
+                  <c:v>60</c:v>
+                </c:pt>
+                <c:pt idx="5">
+                  <c:v>65.555555555555557</c:v>
+                </c:pt>
+                <c:pt idx="6">
+                  <c:v>65.555555555555557</c:v>
+                </c:pt>
+                <c:pt idx="7">
+                  <c:v>60</c:v>
+                </c:pt>
+                <c:pt idx="8">
+                  <c:v>54.444444444444443</c:v>
+                </c:pt>
+                <c:pt idx="9">
+                  <c:v>48.888888888888886</c:v>
+                </c:pt>
+                <c:pt idx="10">
+                  <c:v>43.333333333333336</c:v>
+                </c:pt>
+                <c:pt idx="11">
+                  <c:v>26.666666666666668</c:v>
+                </c:pt>
+                <c:pt idx="12">
+                  <c:v>26.666666666666668</c:v>
+                </c:pt>
+              </c:numCache>
+            </c:numRef>
+          </c:yVal>
+          <c:smooth val="0"/>
+        </c:ser>
+        <c:ser>
+          <c:idx val="2"/>
+          <c:order val="2"/>
+          <c:tx>
+            <c:strRef>
+              <c:f>Opearting_range_SI!$J$1</c:f>
+              <c:strCache>
+                <c:ptCount val="1"/>
+                <c:pt idx="0">
+                  <c:v>Map 2</c:v>
+                </c:pt>
+              </c:strCache>
+            </c:strRef>
+          </c:tx>
+          <c:spPr>
+            <a:ln w="63500">
+              <a:prstDash val="dash"/>
+            </a:ln>
+          </c:spPr>
+          <c:marker>
+            <c:symbol val="none"/>
+          </c:marker>
+          <c:xVal>
+            <c:numRef>
+              <c:f>Opearting_range_SI!$K$3:$K$15</c:f>
+              <c:numCache>
+                <c:formatCode>General</c:formatCode>
+                <c:ptCount val="13"/>
+                <c:pt idx="0">
+                  <c:v>-17.777777777777779</c:v>
+                </c:pt>
+                <c:pt idx="1">
+                  <c:v>-17.777777777777779</c:v>
+                </c:pt>
+                <c:pt idx="2">
+                  <c:v>-17.777777777777779</c:v>
+                </c:pt>
+                <c:pt idx="3">
+                  <c:v>-17.777777777777779</c:v>
+                </c:pt>
+                <c:pt idx="4">
+                  <c:v>-17.777777777777779</c:v>
+                </c:pt>
+                <c:pt idx="5">
+                  <c:v>-12.222222222222221</c:v>
+                </c:pt>
+                <c:pt idx="6">
+                  <c:v>10</c:v>
+                </c:pt>
+                <c:pt idx="7">
+                  <c:v>10</c:v>
+                </c:pt>
+                <c:pt idx="8">
+                  <c:v>10</c:v>
+                </c:pt>
+                <c:pt idx="9">
+                  <c:v>10</c:v>
+                </c:pt>
+                <c:pt idx="10">
+                  <c:v>10</c:v>
+                </c:pt>
+                <c:pt idx="11">
+                  <c:v>10</c:v>
+                </c:pt>
+                <c:pt idx="12">
+                  <c:v>-17.777777777777779</c:v>
+                </c:pt>
+              </c:numCache>
+            </c:numRef>
+          </c:xVal>
+          <c:yVal>
+            <c:numRef>
+              <c:f>Opearting_range_SI!$J$3:$J$15</c:f>
+              <c:numCache>
+                <c:formatCode>General</c:formatCode>
+                <c:ptCount val="13"/>
+                <c:pt idx="0">
+                  <c:v>26.666666666666668</c:v>
+                </c:pt>
+                <c:pt idx="1">
+                  <c:v>43.333333333333336</c:v>
+                </c:pt>
+                <c:pt idx="2">
+                  <c:v>48.888888888888886</c:v>
+                </c:pt>
+                <c:pt idx="3">
+                  <c:v>54.444444444444443</c:v>
+                </c:pt>
+                <c:pt idx="4">
+                  <c:v>60</c:v>
+                </c:pt>
+                <c:pt idx="5">
+                  <c:v>65.555555555555557</c:v>
+                </c:pt>
+                <c:pt idx="6">
+                  <c:v>65.555555555555557</c:v>
+                </c:pt>
+                <c:pt idx="7">
+                  <c:v>60</c:v>
+                </c:pt>
+                <c:pt idx="8">
+                  <c:v>54.444444444444443</c:v>
+                </c:pt>
+                <c:pt idx="9">
+                  <c:v>48.888888888888886</c:v>
+                </c:pt>
+                <c:pt idx="10">
+                  <c:v>43.333333333333336</c:v>
+                </c:pt>
+                <c:pt idx="11">
+                  <c:v>26.666666666666668</c:v>
+                </c:pt>
+                <c:pt idx="12">
+                  <c:v>26.666666666666668</c:v>
+                </c:pt>
+              </c:numCache>
+            </c:numRef>
+          </c:yVal>
+          <c:smooth val="0"/>
+        </c:ser>
+        <c:ser>
+          <c:idx val="3"/>
+          <c:order val="3"/>
+          <c:tx>
+            <c:strRef>
+              <c:f>Opearting_range_SI!$A$21</c:f>
+              <c:strCache>
+                <c:ptCount val="1"/>
+                <c:pt idx="0">
+                  <c:v>Map 3</c:v>
+                </c:pt>
+              </c:strCache>
+            </c:strRef>
+          </c:tx>
+          <c:spPr>
+            <a:ln cmpd="dbl">
+              <a:prstDash val="dash"/>
+            </a:ln>
+          </c:spPr>
+          <c:marker>
+            <c:symbol val="none"/>
+          </c:marker>
+          <c:xVal>
+            <c:numRef>
+              <c:f>Opearting_range_SI!$B$23:$B$35</c:f>
+              <c:numCache>
+                <c:formatCode>General</c:formatCode>
+                <c:ptCount val="13"/>
+                <c:pt idx="0">
+                  <c:v>-23.333333333333332</c:v>
+                </c:pt>
+                <c:pt idx="1">
+                  <c:v>-23.333333333333332</c:v>
+                </c:pt>
+                <c:pt idx="2">
+                  <c:v>-23.333333333333332</c:v>
+                </c:pt>
+                <c:pt idx="3">
+                  <c:v>-23.333333333333332</c:v>
+                </c:pt>
+                <c:pt idx="4">
+                  <c:v>-20.555555555555557</c:v>
+                </c:pt>
+                <c:pt idx="5">
+                  <c:v>-17.777777777777779</c:v>
+                </c:pt>
+                <c:pt idx="6">
+                  <c:v>7.2222222222222223</c:v>
+                </c:pt>
+                <c:pt idx="7">
+                  <c:v>7.2222222222222223</c:v>
+                </c:pt>
+                <c:pt idx="8">
+                  <c:v>7.2222222222222223</c:v>
+                </c:pt>
+                <c:pt idx="9">
+                  <c:v>7.2222222222222223</c:v>
+                </c:pt>
+                <c:pt idx="10">
+                  <c:v>7.2222222222222223</c:v>
+                </c:pt>
+                <c:pt idx="11">
+                  <c:v>7.2222222222222223</c:v>
+                </c:pt>
+                <c:pt idx="12">
+                  <c:v>-23.333333333333332</c:v>
+                </c:pt>
+              </c:numCache>
+            </c:numRef>
+          </c:xVal>
+          <c:yVal>
+            <c:numRef>
+              <c:f>Opearting_range_SI!$A$23:$A$35</c:f>
+              <c:numCache>
+                <c:formatCode>General</c:formatCode>
+                <c:ptCount val="13"/>
+                <c:pt idx="0">
+                  <c:v>26.666666666666668</c:v>
+                </c:pt>
+                <c:pt idx="1">
+                  <c:v>37.777777777777779</c:v>
+                </c:pt>
+                <c:pt idx="2">
+                  <c:v>43.333333333333336</c:v>
+                </c:pt>
+                <c:pt idx="3">
+                  <c:v>48.888888888888886</c:v>
+                </c:pt>
+                <c:pt idx="4">
+                  <c:v>54.444444444444443</c:v>
+                </c:pt>
+                <c:pt idx="5">
+                  <c:v>60</c:v>
+                </c:pt>
+                <c:pt idx="6">
+                  <c:v>60</c:v>
+                </c:pt>
+                <c:pt idx="7">
+                  <c:v>54.444444444444443</c:v>
+                </c:pt>
+                <c:pt idx="8">
+                  <c:v>48.888888888888886</c:v>
+                </c:pt>
+                <c:pt idx="9">
+                  <c:v>43.333333333333336</c:v>
+                </c:pt>
+                <c:pt idx="10">
+                  <c:v>37.777777777777779</c:v>
+                </c:pt>
+                <c:pt idx="11">
+                  <c:v>26.666666666666668</c:v>
+                </c:pt>
+                <c:pt idx="12">
+                  <c:v>26.666666666666668</c:v>
+                </c:pt>
+              </c:numCache>
+            </c:numRef>
+          </c:yVal>
+          <c:smooth val="0"/>
+        </c:ser>
+        <c:ser>
+          <c:idx val="4"/>
+          <c:order val="4"/>
+          <c:tx>
+            <c:strRef>
+              <c:f>Opearting_range_SI!$D$21</c:f>
+              <c:strCache>
+                <c:ptCount val="1"/>
+                <c:pt idx="0">
+                  <c:v>Map 4</c:v>
+                </c:pt>
+              </c:strCache>
+            </c:strRef>
+          </c:tx>
+          <c:spPr>
+            <a:ln w="95250" cmpd="tri">
+              <a:prstDash val="lgDash"/>
+            </a:ln>
+          </c:spPr>
+          <c:marker>
+            <c:symbol val="none"/>
+          </c:marker>
+          <c:xVal>
+            <c:numRef>
+              <c:f>Opearting_range_SI!$E$23:$E$35</c:f>
+              <c:numCache>
+                <c:formatCode>General</c:formatCode>
+                <c:ptCount val="13"/>
+                <c:pt idx="0">
+                  <c:v>-26.111111111111111</c:v>
+                </c:pt>
+                <c:pt idx="1">
+                  <c:v>-26.111111111111111</c:v>
+                </c:pt>
+                <c:pt idx="2">
+                  <c:v>-26.111111111111111</c:v>
+                </c:pt>
+                <c:pt idx="3">
+                  <c:v>-26.111111111111111</c:v>
+                </c:pt>
+                <c:pt idx="4">
+                  <c:v>-23.333333333333332</c:v>
+                </c:pt>
+                <c:pt idx="5">
+                  <c:v>-20.555555555555557</c:v>
+                </c:pt>
+                <c:pt idx="6">
+                  <c:v>7.2222222222222223</c:v>
+                </c:pt>
+                <c:pt idx="7">
+                  <c:v>7.2222222222222223</c:v>
+                </c:pt>
+                <c:pt idx="8">
+                  <c:v>7.2222222222222223</c:v>
+                </c:pt>
+                <c:pt idx="9">
+                  <c:v>7.2222222222222223</c:v>
+                </c:pt>
+                <c:pt idx="10">
+                  <c:v>7.2222222222222223</c:v>
+                </c:pt>
+                <c:pt idx="11">
+                  <c:v>7.2222222222222223</c:v>
+                </c:pt>
+                <c:pt idx="12">
+                  <c:v>-26.111111111111111</c:v>
+                </c:pt>
+              </c:numCache>
+            </c:numRef>
+          </c:xVal>
+          <c:yVal>
+            <c:numRef>
+              <c:f>Opearting_range_SI!$D$23:$D$35</c:f>
+              <c:numCache>
+                <c:formatCode>General</c:formatCode>
+                <c:ptCount val="13"/>
+                <c:pt idx="0">
+                  <c:v>26.666666666666668</c:v>
+                </c:pt>
+                <c:pt idx="1">
+                  <c:v>32.222222222222221</c:v>
+                </c:pt>
+                <c:pt idx="2">
+                  <c:v>37.777777777777779</c:v>
+                </c:pt>
+                <c:pt idx="3">
+                  <c:v>43.333333333333336</c:v>
+                </c:pt>
+                <c:pt idx="4">
+                  <c:v>48.888888888888886</c:v>
+                </c:pt>
+                <c:pt idx="5">
+                  <c:v>54.444444444444443</c:v>
+                </c:pt>
+                <c:pt idx="6">
+                  <c:v>54.444444444444443</c:v>
+                </c:pt>
+                <c:pt idx="7">
+                  <c:v>48.888888888888886</c:v>
+                </c:pt>
+                <c:pt idx="8">
+                  <c:v>43.333333333333336</c:v>
+                </c:pt>
+                <c:pt idx="9">
+                  <c:v>37.777777777777779</c:v>
+                </c:pt>
+                <c:pt idx="10">
+                  <c:v>32.222222222222221</c:v>
+                </c:pt>
+                <c:pt idx="11">
+                  <c:v>26.666666666666668</c:v>
+                </c:pt>
+                <c:pt idx="12">
+                  <c:v>26.666666666666668</c:v>
+                </c:pt>
+              </c:numCache>
+            </c:numRef>
+          </c:yVal>
+          <c:smooth val="0"/>
+        </c:ser>
+        <c:ser>
+          <c:idx val="5"/>
+          <c:order val="5"/>
+          <c:tx>
+            <c:strRef>
+              <c:f>Opearting_range_SI!$G$21</c:f>
+              <c:strCache>
+                <c:ptCount val="1"/>
+                <c:pt idx="0">
+                  <c:v>Map 5</c:v>
+                </c:pt>
+              </c:strCache>
+            </c:strRef>
+          </c:tx>
+          <c:spPr>
+            <a:ln w="98425" cap="flat" cmpd="dbl">
+              <a:prstDash val="sysDot"/>
+            </a:ln>
+          </c:spPr>
+          <c:marker>
+            <c:symbol val="none"/>
+          </c:marker>
+          <c:xVal>
+            <c:numRef>
+              <c:f>Opearting_range_SI!$H$23:$H$35</c:f>
+              <c:numCache>
+                <c:formatCode>General</c:formatCode>
+                <c:ptCount val="13"/>
+                <c:pt idx="0">
+                  <c:v>-28.888888888888889</c:v>
+                </c:pt>
+                <c:pt idx="1">
+                  <c:v>-28.888888888888889</c:v>
+                </c:pt>
+                <c:pt idx="2">
+                  <c:v>-28.888888888888889</c:v>
+                </c:pt>
+                <c:pt idx="3">
+                  <c:v>-26.111111111111111</c:v>
+                </c:pt>
+                <c:pt idx="4">
+                  <c:v>-23.333333333333332</c:v>
+                </c:pt>
+                <c:pt idx="5">
+                  <c:v>-20.555555555555557</c:v>
+                </c:pt>
+                <c:pt idx="6">
+                  <c:v>7.2222222222222223</c:v>
+                </c:pt>
+                <c:pt idx="7">
+                  <c:v>7.2222222222222223</c:v>
+                </c:pt>
+                <c:pt idx="8">
+                  <c:v>7.2222222222222223</c:v>
+                </c:pt>
+                <c:pt idx="9">
+                  <c:v>7.2222222222222223</c:v>
+                </c:pt>
+                <c:pt idx="10">
+                  <c:v>7.2222222222222223</c:v>
+                </c:pt>
+                <c:pt idx="11">
+                  <c:v>7.2222222222222223</c:v>
+                </c:pt>
+                <c:pt idx="12">
+                  <c:v>-28.888888888888889</c:v>
+                </c:pt>
+              </c:numCache>
+            </c:numRef>
+          </c:xVal>
+          <c:yVal>
+            <c:numRef>
+              <c:f>Opearting_range_SI!$G$23:$G$35</c:f>
+              <c:numCache>
+                <c:formatCode>General</c:formatCode>
+                <c:ptCount val="13"/>
+                <c:pt idx="0">
+                  <c:v>26.666666666666668</c:v>
+                </c:pt>
+                <c:pt idx="1">
+                  <c:v>32.222222222222221</c:v>
+                </c:pt>
+                <c:pt idx="2">
+                  <c:v>37.777777777777779</c:v>
+                </c:pt>
+                <c:pt idx="3">
+                  <c:v>43.333333333333336</c:v>
+                </c:pt>
+                <c:pt idx="4">
+                  <c:v>48.888888888888886</c:v>
+                </c:pt>
+                <c:pt idx="5">
+                  <c:v>54.444444444444443</c:v>
+                </c:pt>
+                <c:pt idx="6">
+                  <c:v>54.444444444444443</c:v>
+                </c:pt>
+                <c:pt idx="7">
+                  <c:v>48.888888888888886</c:v>
+                </c:pt>
+                <c:pt idx="8">
+                  <c:v>43.333333333333336</c:v>
+                </c:pt>
+                <c:pt idx="9">
+                  <c:v>37.777777777777779</c:v>
+                </c:pt>
+                <c:pt idx="10">
+                  <c:v>32.222222222222221</c:v>
+                </c:pt>
+                <c:pt idx="11">
+                  <c:v>26.666666666666668</c:v>
+                </c:pt>
+                <c:pt idx="12">
+                  <c:v>26.666666666666668</c:v>
+                </c:pt>
+              </c:numCache>
+            </c:numRef>
+          </c:yVal>
+          <c:smooth val="0"/>
+        </c:ser>
+        <c:dLbls>
+          <c:showLegendKey val="0"/>
+          <c:showVal val="0"/>
+          <c:showCatName val="0"/>
+          <c:showSerName val="0"/>
+          <c:showPercent val="0"/>
+          <c:showBubbleSize val="0"/>
+        </c:dLbls>
+        <c:axId val="53294144"/>
+        <c:axId val="162636928"/>
+      </c:scatterChart>
+      <c:valAx>
+        <c:axId val="53294144"/>
+        <c:scaling>
+          <c:orientation val="minMax"/>
+          <c:min val="-30"/>
+        </c:scaling>
+        <c:delete val="0"/>
+        <c:axPos val="b"/>
+        <c:title>
+          <c:tx>
+            <c:rich>
+              <a:bodyPr/>
+              <a:lstStyle/>
+              <a:p>
+                <a:pPr>
+                  <a:defRPr/>
+                </a:pPr>
+                <a:r>
+                  <a:rPr lang="en-US"/>
+                  <a:t>Evaporating temperature [°C]</a:t>
+                </a:r>
+              </a:p>
+            </c:rich>
+          </c:tx>
+          <c:layout/>
+          <c:overlay val="0"/>
+        </c:title>
+        <c:numFmt formatCode="General" sourceLinked="1"/>
+        <c:majorTickMark val="out"/>
+        <c:minorTickMark val="none"/>
+        <c:tickLblPos val="nextTo"/>
+        <c:crossAx val="162636928"/>
+        <c:crosses val="autoZero"/>
+        <c:crossBetween val="midCat"/>
+      </c:valAx>
+      <c:valAx>
+        <c:axId val="162636928"/>
+        <c:scaling>
+          <c:orientation val="minMax"/>
+        </c:scaling>
+        <c:delete val="0"/>
+        <c:axPos val="l"/>
+        <c:majorGridlines/>
+        <c:title>
+          <c:tx>
+            <c:rich>
+              <a:bodyPr rot="-5400000" vert="horz"/>
+              <a:lstStyle/>
+              <a:p>
+                <a:pPr>
+                  <a:defRPr/>
+                </a:pPr>
+                <a:r>
+                  <a:rPr lang="en-US"/>
+                  <a:t>Condensing temperature [°C]</a:t>
+                </a:r>
+              </a:p>
+            </c:rich>
+          </c:tx>
+          <c:layout>
+            <c:manualLayout>
+              <c:xMode val="edge"/>
+              <c:yMode val="edge"/>
+              <c:x val="3.0555555555555555E-2"/>
+              <c:y val="0.14314260717410326"/>
+            </c:manualLayout>
+          </c:layout>
+          <c:overlay val="0"/>
+        </c:title>
+        <c:numFmt formatCode="General" sourceLinked="1"/>
+        <c:majorTickMark val="out"/>
+        <c:minorTickMark val="none"/>
+        <c:tickLblPos val="nextTo"/>
+        <c:crossAx val="53294144"/>
+        <c:crossesAt val="-30"/>
+        <c:crossBetween val="midCat"/>
+      </c:valAx>
+    </c:plotArea>
+    <c:legend>
+      <c:legendPos val="r"/>
+      <c:layout>
+        <c:manualLayout>
+          <c:xMode val="edge"/>
+          <c:yMode val="edge"/>
+          <c:x val="0.17909656605424321"/>
+          <c:y val="0.57951443569553807"/>
+          <c:w val="0.80007010061242345"/>
+          <c:h val="0.24282298046077577"/>
+        </c:manualLayout>
+      </c:layout>
+      <c:overlay val="1"/>
+      <c:spPr>
+        <a:solidFill>
+          <a:schemeClr val="bg1"/>
+        </a:solidFill>
+      </c:spPr>
+    </c:legend>
+    <c:plotVisOnly val="1"/>
+    <c:dispBlanksAs val="gap"/>
+    <c:showDLblsOverMax val="0"/>
+  </c:chart>
+  <c:txPr>
+    <a:bodyPr/>
+    <a:lstStyle/>
+    <a:p>
+      <a:pPr>
+        <a:defRPr sz="2500">
+          <a:latin typeface="Garamond" panose="02020404030301010803" pitchFamily="18" charset="0"/>
+        </a:defRPr>
+      </a:pPr>
+      <a:endParaRPr lang="en-US"/>
+    </a:p>
+  </c:txPr>
+  <c:externalData r:id="rId1">
+    <c:autoUpdate val="0"/>
+  </c:externalData>
+</c:chartSpace>
 </file>
 
 <file path=ppt/slideLayouts/slideLayout1.xml><?xml version="1.0" encoding="utf-8"?>
@@ -304,7 +1198,7 @@
           <a:p>
             <a:fld id="{987A5A01-F4F1-466C-A6C7-6D43425C9F0D}" type="datetimeFigureOut">
               <a:rPr lang="en-US" smtClean="0"/>
-              <a:t>2/8/2015</a:t>
+              <a:t>2/9/2015</a:t>
             </a:fld>
             <a:endParaRPr lang="en-US"/>
           </a:p>
@@ -474,7 +1368,7 @@
           <a:p>
             <a:fld id="{987A5A01-F4F1-466C-A6C7-6D43425C9F0D}" type="datetimeFigureOut">
               <a:rPr lang="en-US" smtClean="0"/>
-              <a:t>2/8/2015</a:t>
+              <a:t>2/9/2015</a:t>
             </a:fld>
             <a:endParaRPr lang="en-US"/>
           </a:p>
@@ -654,7 +1548,7 @@
           <a:p>
             <a:fld id="{987A5A01-F4F1-466C-A6C7-6D43425C9F0D}" type="datetimeFigureOut">
               <a:rPr lang="en-US" smtClean="0"/>
-              <a:t>2/8/2015</a:t>
+              <a:t>2/9/2015</a:t>
             </a:fld>
             <a:endParaRPr lang="en-US"/>
           </a:p>
@@ -824,7 +1718,7 @@
           <a:p>
             <a:fld id="{987A5A01-F4F1-466C-A6C7-6D43425C9F0D}" type="datetimeFigureOut">
               <a:rPr lang="en-US" smtClean="0"/>
-              <a:t>2/8/2015</a:t>
+              <a:t>2/9/2015</a:t>
             </a:fld>
             <a:endParaRPr lang="en-US"/>
           </a:p>
@@ -1070,7 +1964,7 @@
           <a:p>
             <a:fld id="{987A5A01-F4F1-466C-A6C7-6D43425C9F0D}" type="datetimeFigureOut">
               <a:rPr lang="en-US" smtClean="0"/>
-              <a:t>2/8/2015</a:t>
+              <a:t>2/9/2015</a:t>
             </a:fld>
             <a:endParaRPr lang="en-US"/>
           </a:p>
@@ -1358,7 +2252,7 @@
           <a:p>
             <a:fld id="{987A5A01-F4F1-466C-A6C7-6D43425C9F0D}" type="datetimeFigureOut">
               <a:rPr lang="en-US" smtClean="0"/>
-              <a:t>2/8/2015</a:t>
+              <a:t>2/9/2015</a:t>
             </a:fld>
             <a:endParaRPr lang="en-US"/>
           </a:p>
@@ -1780,7 +2674,7 @@
           <a:p>
             <a:fld id="{987A5A01-F4F1-466C-A6C7-6D43425C9F0D}" type="datetimeFigureOut">
               <a:rPr lang="en-US" smtClean="0"/>
-              <a:t>2/8/2015</a:t>
+              <a:t>2/9/2015</a:t>
             </a:fld>
             <a:endParaRPr lang="en-US"/>
           </a:p>
@@ -1898,7 +2792,7 @@
           <a:p>
             <a:fld id="{987A5A01-F4F1-466C-A6C7-6D43425C9F0D}" type="datetimeFigureOut">
               <a:rPr lang="en-US" smtClean="0"/>
-              <a:t>2/8/2015</a:t>
+              <a:t>2/9/2015</a:t>
             </a:fld>
             <a:endParaRPr lang="en-US"/>
           </a:p>
@@ -1993,7 +2887,7 @@
           <a:p>
             <a:fld id="{987A5A01-F4F1-466C-A6C7-6D43425C9F0D}" type="datetimeFigureOut">
               <a:rPr lang="en-US" smtClean="0"/>
-              <a:t>2/8/2015</a:t>
+              <a:t>2/9/2015</a:t>
             </a:fld>
             <a:endParaRPr lang="en-US"/>
           </a:p>
@@ -2270,7 +3164,7 @@
           <a:p>
             <a:fld id="{987A5A01-F4F1-466C-A6C7-6D43425C9F0D}" type="datetimeFigureOut">
               <a:rPr lang="en-US" smtClean="0"/>
-              <a:t>2/8/2015</a:t>
+              <a:t>2/9/2015</a:t>
             </a:fld>
             <a:endParaRPr lang="en-US"/>
           </a:p>
@@ -2523,7 +3417,7 @@
           <a:p>
             <a:fld id="{987A5A01-F4F1-466C-A6C7-6D43425C9F0D}" type="datetimeFigureOut">
               <a:rPr lang="en-US" smtClean="0"/>
-              <a:t>2/8/2015</a:t>
+              <a:t>2/9/2015</a:t>
             </a:fld>
             <a:endParaRPr lang="en-US"/>
           </a:p>
@@ -2736,7 +3630,7 @@
           <a:p>
             <a:fld id="{987A5A01-F4F1-466C-A6C7-6D43425C9F0D}" type="datetimeFigureOut">
               <a:rPr lang="en-US" smtClean="0"/>
-              <a:t>2/8/2015</a:t>
+              <a:t>2/9/2015</a:t>
             </a:fld>
             <a:endParaRPr lang="en-US"/>
           </a:p>
@@ -3111,88 +4005,30 @@
           <a:chExt cx="0" cy="0"/>
         </a:xfrm>
       </p:grpSpPr>
-      <p:pic>
-        <p:nvPicPr>
-          <p:cNvPr id="3" name="Picture 2"/>
-          <p:cNvPicPr>
-            <a:picLocks noChangeAspect="1"/>
-          </p:cNvPicPr>
-          <p:nvPr/>
-        </p:nvPicPr>
-        <p:blipFill>
-          <a:blip r:embed="rId2">
-            <a:extLst>
-              <a:ext uri="{28A0092B-C50C-407E-A947-70E740481C1C}">
-                <a14:useLocalDpi xmlns:a14="http://schemas.microsoft.com/office/drawing/2010/main" val="0"/>
-              </a:ext>
-            </a:extLst>
-          </a:blip>
-          <a:stretch>
-            <a:fillRect/>
-          </a:stretch>
-        </p:blipFill>
-        <p:spPr>
-          <a:xfrm>
-            <a:off x="-31596" y="16727"/>
-            <a:ext cx="9175596" cy="6841273"/>
-          </a:xfrm>
-          <a:prstGeom prst="rect">
-            <a:avLst/>
-          </a:prstGeom>
-        </p:spPr>
-      </p:pic>
-      <p:sp>
-        <p:nvSpPr>
-          <p:cNvPr id="4" name="TextBox 3"/>
-          <p:cNvSpPr txBox="1"/>
-          <p:nvPr/>
-        </p:nvSpPr>
-        <p:spPr>
-          <a:xfrm rot="19010373">
-            <a:off x="936064" y="2836370"/>
-            <a:ext cx="6543458" cy="646331"/>
-          </a:xfrm>
-          <a:prstGeom prst="rect">
-            <a:avLst/>
-          </a:prstGeom>
-          <a:noFill/>
-        </p:spPr>
-        <p:txBody>
-          <a:bodyPr wrap="none" rtlCol="0">
-            <a:spAutoFit/>
-          </a:bodyPr>
-          <a:lstStyle/>
-          <a:p>
-            <a:r>
-              <a:rPr lang="en-US" sz="3600" b="1" u="sng" dirty="0" smtClean="0">
-                <a:solidFill>
-                  <a:srgbClr val="FF0000"/>
-                </a:solidFill>
-                <a:effectLst>
-                  <a:outerShdw blurRad="38100" dist="38100" dir="2700000" algn="tl">
-                    <a:srgbClr val="000000">
-                      <a:alpha val="43137"/>
-                    </a:srgbClr>
-                  </a:outerShdw>
-                </a:effectLst>
-              </a:rPr>
-              <a:t>Please update me and add map 7</a:t>
-            </a:r>
-            <a:endParaRPr lang="en-US" sz="3600" b="1" u="sng" dirty="0">
-              <a:solidFill>
-                <a:srgbClr val="FF0000"/>
-              </a:solidFill>
-              <a:effectLst>
-                <a:outerShdw blurRad="38100" dist="38100" dir="2700000" algn="tl">
-                  <a:srgbClr val="000000">
-                    <a:alpha val="43137"/>
-                  </a:srgbClr>
-                </a:outerShdw>
-              </a:effectLst>
-            </a:endParaRPr>
-          </a:p>
-        </p:txBody>
-      </p:sp>
+      <p:graphicFrame>
+        <p:nvGraphicFramePr>
+          <p:cNvPr id="5" name="Chart 4"/>
+          <p:cNvGraphicFramePr>
+            <a:graphicFrameLocks/>
+          </p:cNvGraphicFramePr>
+          <p:nvPr>
+            <p:extLst>
+              <p:ext uri="{D42A27DB-BD31-4B8C-83A1-F6EECF244321}">
+                <p14:modId xmlns:p14="http://schemas.microsoft.com/office/powerpoint/2010/main" val="411865916"/>
+              </p:ext>
+            </p:extLst>
+          </p:nvPr>
+        </p:nvGraphicFramePr>
+        <p:xfrm>
+          <a:off x="35417" y="-2146"/>
+          <a:ext cx="9144000" cy="6858000"/>
+        </p:xfrm>
+        <a:graphic>
+          <a:graphicData uri="http://schemas.openxmlformats.org/drawingml/2006/chart">
+            <c:chart xmlns:c="http://schemas.openxmlformats.org/drawingml/2006/chart" xmlns:r="http://schemas.openxmlformats.org/officeDocument/2006/relationships" r:id="rId2"/>
+          </a:graphicData>
+        </a:graphic>
+      </p:graphicFrame>
     </p:spTree>
     <p:extLst>
       <p:ext uri="{BB962C8B-B14F-4D97-AF65-F5344CB8AC3E}">

</xml_diff>